<commit_message>
Import second TP Scilab.
</commit_message>
<xml_diff>
--- a/Serie_3_SLCI_Scilab/Documentation_Scilab.pptx
+++ b/Serie_3_SLCI_Scilab/Documentation_Scilab.pptx
@@ -5,10 +5,10 @@
     <p:sldMasterId id="2147483648" r:id="rId1"/>
   </p:sldMasterIdLst>
   <p:notesMasterIdLst>
-    <p:notesMasterId r:id="rId19"/>
+    <p:notesMasterId r:id="rId20"/>
   </p:notesMasterIdLst>
   <p:handoutMasterIdLst>
-    <p:handoutMasterId r:id="rId20"/>
+    <p:handoutMasterId r:id="rId21"/>
   </p:handoutMasterIdLst>
   <p:sldIdLst>
     <p:sldId id="256" r:id="rId2"/>
@@ -28,6 +28,7 @@
     <p:sldId id="328" r:id="rId16"/>
     <p:sldId id="326" r:id="rId17"/>
     <p:sldId id="327" r:id="rId18"/>
+    <p:sldId id="333" r:id="rId19"/>
   </p:sldIdLst>
   <p:sldSz cx="9144000" cy="6858000" type="screen4x3"/>
   <p:notesSz cx="7099300" cy="10234613"/>
@@ -206,7 +207,7 @@
             <a:fld id="{31555DB1-8736-42A3-B48D-2B08FB93332A}" type="datetimeFigureOut">
               <a:rPr lang="fr-FR" smtClean="0"/>
               <a:pPr/>
-              <a:t>04/11/2013</a:t>
+              <a:t>12/11/2013</a:t>
             </a:fld>
             <a:endParaRPr lang="fr-FR"/>
           </a:p>
@@ -278,7 +279,7 @@
     </p:spTree>
     <p:extLst>
       <p:ext uri="{BB962C8B-B14F-4D97-AF65-F5344CB8AC3E}">
-        <p14:creationId xmlns:p14="http://schemas.microsoft.com/office/powerpoint/2010/main" val="1438495985"/>
+        <p14:creationId xmlns:p14="http://schemas.microsoft.com/office/powerpoint/2010/main" xmlns="" val="1438495985"/>
       </p:ext>
     </p:extLst>
   </p:cSld>
@@ -365,7 +366,7 @@
             <a:fld id="{0BDB199F-A56C-4049-BA04-1447030960FF}" type="datetimeFigureOut">
               <a:rPr lang="fr-FR"/>
               <a:pPr/>
-              <a:t>04/11/2013</a:t>
+              <a:t>12/11/2013</a:t>
             </a:fld>
             <a:endParaRPr lang="fr-FR"/>
           </a:p>
@@ -535,7 +536,7 @@
     </p:spTree>
     <p:extLst>
       <p:ext uri="{BB962C8B-B14F-4D97-AF65-F5344CB8AC3E}">
-        <p14:creationId xmlns:p14="http://schemas.microsoft.com/office/powerpoint/2010/main" val="4250513878"/>
+        <p14:creationId xmlns:p14="http://schemas.microsoft.com/office/powerpoint/2010/main" xmlns="" val="4250513878"/>
       </p:ext>
     </p:extLst>
   </p:cSld>
@@ -5752,7 +5753,7 @@
           <a:blip r:embed="rId2" cstate="print">
             <a:extLst>
               <a:ext uri="{28A0092B-C50C-407E-A947-70E740481C1C}">
-                <a14:useLocalDpi xmlns:a14="http://schemas.microsoft.com/office/drawing/2010/main" val="0"/>
+                <a14:useLocalDpi xmlns:a14="http://schemas.microsoft.com/office/drawing/2010/main" xmlns="" val="0"/>
               </a:ext>
             </a:extLst>
           </a:blip>
@@ -5775,14 +5776,14 @@
           </a:ln>
           <a:extLst>
             <a:ext uri="{909E8E84-426E-40DD-AFC4-6F175D3DCCD1}">
-              <a14:hiddenFill xmlns:a14="http://schemas.microsoft.com/office/drawing/2010/main">
+              <a14:hiddenFill xmlns:a14="http://schemas.microsoft.com/office/drawing/2010/main" xmlns="">
                 <a:solidFill>
                   <a:srgbClr val="FFFFFF"/>
                 </a:solidFill>
               </a14:hiddenFill>
             </a:ext>
             <a:ext uri="{91240B29-F687-4F45-9708-019B960494DF}">
-              <a14:hiddenLine xmlns:a14="http://schemas.microsoft.com/office/drawing/2010/main" w="9525">
+              <a14:hiddenLine xmlns:a14="http://schemas.microsoft.com/office/drawing/2010/main" xmlns="" w="9525">
                 <a:solidFill>
                   <a:srgbClr val="000000"/>
                 </a:solidFill>
@@ -7324,7 +7325,7 @@
           <a:blip r:embed="rId2" cstate="print">
             <a:extLst>
               <a:ext uri="{28A0092B-C50C-407E-A947-70E740481C1C}">
-                <a14:useLocalDpi xmlns:a14="http://schemas.microsoft.com/office/drawing/2010/main" val="0"/>
+                <a14:useLocalDpi xmlns:a14="http://schemas.microsoft.com/office/drawing/2010/main" xmlns="" val="0"/>
               </a:ext>
             </a:extLst>
           </a:blip>
@@ -9332,7 +9333,7 @@
           <a:blip r:embed="rId18" cstate="print">
             <a:extLst>
               <a:ext uri="{28A0092B-C50C-407E-A947-70E740481C1C}">
-                <a14:useLocalDpi xmlns:a14="http://schemas.microsoft.com/office/drawing/2010/main" val="0"/>
+                <a14:useLocalDpi xmlns:a14="http://schemas.microsoft.com/office/drawing/2010/main" xmlns="" val="0"/>
               </a:ext>
             </a:extLst>
           </a:blip>
@@ -11946,7 +11947,7 @@
     </p:spTree>
     <p:extLst>
       <p:ext uri="{BB962C8B-B14F-4D97-AF65-F5344CB8AC3E}">
-        <p14:creationId xmlns:p14="http://schemas.microsoft.com/office/powerpoint/2010/main" val="494579730"/>
+        <p14:creationId xmlns:p14="http://schemas.microsoft.com/office/powerpoint/2010/main" xmlns="" val="494579730"/>
       </p:ext>
     </p:extLst>
   </p:cSld>
@@ -12282,6 +12283,328 @@
 </p:sld>
 </file>
 
+<file path=ppt/slides/slide18.xml><?xml version="1.0" encoding="utf-8"?>
+<p:sld xmlns:a="http://schemas.openxmlformats.org/drawingml/2006/main" xmlns:r="http://schemas.openxmlformats.org/officeDocument/2006/relationships" xmlns:p="http://schemas.openxmlformats.org/presentationml/2006/main">
+  <p:cSld>
+    <p:spTree>
+      <p:nvGrpSpPr>
+        <p:cNvPr id="1" name=""/>
+        <p:cNvGrpSpPr/>
+        <p:nvPr/>
+      </p:nvGrpSpPr>
+      <p:grpSpPr>
+        <a:xfrm>
+          <a:off x="0" y="0"/>
+          <a:ext cx="0" cy="0"/>
+          <a:chOff x="0" y="0"/>
+          <a:chExt cx="0" cy="0"/>
+        </a:xfrm>
+      </p:grpSpPr>
+      <p:pic>
+        <p:nvPicPr>
+          <p:cNvPr id="1028" name="Picture 4"/>
+          <p:cNvPicPr>
+            <a:picLocks noChangeAspect="1" noChangeArrowheads="1"/>
+          </p:cNvPicPr>
+          <p:nvPr/>
+        </p:nvPicPr>
+        <p:blipFill>
+          <a:blip r:embed="rId2"/>
+          <a:srcRect/>
+          <a:stretch>
+            <a:fillRect/>
+          </a:stretch>
+        </p:blipFill>
+        <p:spPr bwMode="auto">
+          <a:xfrm>
+            <a:off x="6072198" y="3286124"/>
+            <a:ext cx="2476500" cy="1219200"/>
+          </a:xfrm>
+          <a:prstGeom prst="rect">
+            <a:avLst/>
+          </a:prstGeom>
+          <a:noFill/>
+          <a:ln w="9525">
+            <a:noFill/>
+            <a:miter lim="800000"/>
+            <a:headEnd/>
+            <a:tailEnd/>
+          </a:ln>
+          <a:effectLst/>
+        </p:spPr>
+      </p:pic>
+      <p:sp>
+        <p:nvSpPr>
+          <p:cNvPr id="2" name="Espace réservé du contenu 1"/>
+          <p:cNvSpPr>
+            <a:spLocks noGrp="1"/>
+          </p:cNvSpPr>
+          <p:nvPr>
+            <p:ph sz="quarter" idx="15"/>
+          </p:nvPr>
+        </p:nvSpPr>
+        <p:spPr>
+          <a:xfrm>
+            <a:off x="304800" y="980728"/>
+            <a:ext cx="6696092" cy="5267672"/>
+          </a:xfrm>
+        </p:spPr>
+        <p:txBody>
+          <a:bodyPr/>
+          <a:lstStyle/>
+          <a:p>
+            <a:r>
+              <a:rPr smtClean="0"/>
+              <a:t>Localisation :</a:t>
+            </a:r>
+          </a:p>
+          <a:p>
+            <a:pPr lvl="1"/>
+            <a:r>
+              <a:rPr smtClean="0"/>
+              <a:t>CPGE</a:t>
+            </a:r>
+          </a:p>
+          <a:p>
+            <a:pPr lvl="1"/>
+            <a:r>
+              <a:rPr smtClean="0"/>
+              <a:t>Analyse : PARAM_VAR</a:t>
+            </a:r>
+          </a:p>
+          <a:p>
+            <a:r>
+              <a:rPr smtClean="0"/>
+              <a:t>Méthode</a:t>
+            </a:r>
+          </a:p>
+          <a:p>
+            <a:pPr lvl="1"/>
+            <a:r>
+              <a:rPr smtClean="0"/>
+              <a:t>1 : Renseigner le contexte </a:t>
+            </a:r>
+          </a:p>
+          <a:p>
+            <a:pPr lvl="1"/>
+            <a:r>
+              <a:rPr smtClean="0"/>
+              <a:t>2 : Renseigner la variable dans le bloc adéquate</a:t>
+            </a:r>
+          </a:p>
+          <a:p>
+            <a:pPr lvl="1"/>
+            <a:r>
+              <a:rPr smtClean="0"/>
+              <a:t>3 : Faire varier le paramètre</a:t>
+            </a:r>
+          </a:p>
+          <a:p>
+            <a:pPr lvl="1"/>
+            <a:r>
+              <a:rPr smtClean="0"/>
+              <a:t>4 : Lancer la simulation</a:t>
+            </a:r>
+          </a:p>
+          <a:p>
+            <a:r>
+              <a:rPr smtClean="0"/>
+              <a:t>Exemple : Variation de l'échelon d'entrée (Paramètre E prenant les valeurs 1, 2 et 3</a:t>
+            </a:r>
+          </a:p>
+          <a:p>
+            <a:pPr lvl="1"/>
+            <a:endParaRPr lang="fr-FR" dirty="0"/>
+          </a:p>
+        </p:txBody>
+      </p:sp>
+      <p:sp>
+        <p:nvSpPr>
+          <p:cNvPr id="3" name="Espace réservé du numéro de diapositive 2"/>
+          <p:cNvSpPr>
+            <a:spLocks noGrp="1"/>
+          </p:cNvSpPr>
+          <p:nvPr>
+            <p:ph type="sldNum" sz="quarter" idx="17"/>
+          </p:nvPr>
+        </p:nvSpPr>
+        <p:spPr/>
+        <p:txBody>
+          <a:bodyPr/>
+          <a:lstStyle/>
+          <a:p>
+            <a:fld id="{256D3EEF-DE4E-429D-8EC4-DDC531AFF587}" type="slidenum">
+              <a:rPr lang="fr-FR" smtClean="0"/>
+              <a:pPr/>
+              <a:t>18</a:t>
+            </a:fld>
+            <a:endParaRPr lang="fr-FR" dirty="0"/>
+          </a:p>
+        </p:txBody>
+      </p:sp>
+      <p:sp>
+        <p:nvSpPr>
+          <p:cNvPr id="4" name="Espace réservé du texte 3"/>
+          <p:cNvSpPr>
+            <a:spLocks noGrp="1"/>
+          </p:cNvSpPr>
+          <p:nvPr>
+            <p:ph type="body" sz="quarter" idx="13"/>
+          </p:nvPr>
+        </p:nvSpPr>
+        <p:spPr/>
+        <p:txBody>
+          <a:bodyPr/>
+          <a:lstStyle/>
+          <a:p>
+            <a:r>
+              <a:rPr smtClean="0"/>
+              <a:t>Multi paramètres</a:t>
+            </a:r>
+            <a:endParaRPr lang="fr-FR" dirty="0"/>
+          </a:p>
+        </p:txBody>
+      </p:sp>
+      <p:pic>
+        <p:nvPicPr>
+          <p:cNvPr id="1027" name="Picture 3"/>
+          <p:cNvPicPr>
+            <a:picLocks noChangeAspect="1" noChangeArrowheads="1"/>
+          </p:cNvPicPr>
+          <p:nvPr/>
+        </p:nvPicPr>
+        <p:blipFill>
+          <a:blip r:embed="rId3"/>
+          <a:srcRect/>
+          <a:stretch>
+            <a:fillRect/>
+          </a:stretch>
+        </p:blipFill>
+        <p:spPr bwMode="auto">
+          <a:xfrm>
+            <a:off x="7072330" y="1071546"/>
+            <a:ext cx="952500" cy="952500"/>
+          </a:xfrm>
+          <a:prstGeom prst="rect">
+            <a:avLst/>
+          </a:prstGeom>
+          <a:noFill/>
+          <a:ln w="9525">
+            <a:noFill/>
+            <a:miter lim="800000"/>
+            <a:headEnd/>
+            <a:tailEnd/>
+          </a:ln>
+          <a:effectLst/>
+        </p:spPr>
+      </p:pic>
+      <p:pic>
+        <p:nvPicPr>
+          <p:cNvPr id="1029" name="Picture 5"/>
+          <p:cNvPicPr>
+            <a:picLocks noChangeAspect="1" noChangeArrowheads="1"/>
+          </p:cNvPicPr>
+          <p:nvPr/>
+        </p:nvPicPr>
+        <p:blipFill>
+          <a:blip r:embed="rId4"/>
+          <a:srcRect/>
+          <a:stretch>
+            <a:fillRect/>
+          </a:stretch>
+        </p:blipFill>
+        <p:spPr bwMode="auto">
+          <a:xfrm>
+            <a:off x="642910" y="5211191"/>
+            <a:ext cx="1857388" cy="1442841"/>
+          </a:xfrm>
+          <a:prstGeom prst="rect">
+            <a:avLst/>
+          </a:prstGeom>
+          <a:noFill/>
+          <a:ln w="9525">
+            <a:noFill/>
+            <a:miter lim="800000"/>
+            <a:headEnd/>
+            <a:tailEnd/>
+          </a:ln>
+          <a:effectLst/>
+        </p:spPr>
+      </p:pic>
+      <p:pic>
+        <p:nvPicPr>
+          <p:cNvPr id="1030" name="Picture 6"/>
+          <p:cNvPicPr>
+            <a:picLocks noChangeAspect="1" noChangeArrowheads="1"/>
+          </p:cNvPicPr>
+          <p:nvPr/>
+        </p:nvPicPr>
+        <p:blipFill>
+          <a:blip r:embed="rId5"/>
+          <a:srcRect/>
+          <a:stretch>
+            <a:fillRect/>
+          </a:stretch>
+        </p:blipFill>
+        <p:spPr bwMode="auto">
+          <a:xfrm>
+            <a:off x="3214678" y="5139753"/>
+            <a:ext cx="1941433" cy="1500198"/>
+          </a:xfrm>
+          <a:prstGeom prst="rect">
+            <a:avLst/>
+          </a:prstGeom>
+          <a:noFill/>
+          <a:ln w="9525">
+            <a:noFill/>
+            <a:miter lim="800000"/>
+            <a:headEnd/>
+            <a:tailEnd/>
+          </a:ln>
+          <a:effectLst/>
+        </p:spPr>
+      </p:pic>
+      <p:pic>
+        <p:nvPicPr>
+          <p:cNvPr id="1031" name="Picture 7"/>
+          <p:cNvPicPr>
+            <a:picLocks noChangeAspect="1" noChangeArrowheads="1"/>
+          </p:cNvPicPr>
+          <p:nvPr/>
+        </p:nvPicPr>
+        <p:blipFill>
+          <a:blip r:embed="rId6"/>
+          <a:srcRect/>
+          <a:stretch>
+            <a:fillRect/>
+          </a:stretch>
+        </p:blipFill>
+        <p:spPr bwMode="auto">
+          <a:xfrm>
+            <a:off x="5929322" y="5000636"/>
+            <a:ext cx="1643074" cy="1718247"/>
+          </a:xfrm>
+          <a:prstGeom prst="rect">
+            <a:avLst/>
+          </a:prstGeom>
+          <a:noFill/>
+          <a:ln w="9525">
+            <a:noFill/>
+            <a:miter lim="800000"/>
+            <a:headEnd/>
+            <a:tailEnd/>
+          </a:ln>
+          <a:effectLst/>
+        </p:spPr>
+      </p:pic>
+    </p:spTree>
+  </p:cSld>
+  <p:clrMapOvr>
+    <a:masterClrMapping/>
+  </p:clrMapOvr>
+</p:sld>
+</file>
+
 <file path=ppt/slides/slide2.xml><?xml version="1.0" encoding="utf-8"?>
 <p:sld xmlns:a="http://schemas.openxmlformats.org/drawingml/2006/main" xmlns:r="http://schemas.openxmlformats.org/officeDocument/2006/relationships" xmlns:p="http://schemas.openxmlformats.org/presentationml/2006/main">
   <p:cSld>
@@ -13090,7 +13413,7 @@
     </p:spTree>
     <p:extLst>
       <p:ext uri="{BB962C8B-B14F-4D97-AF65-F5344CB8AC3E}">
-        <p14:creationId xmlns:p14="http://schemas.microsoft.com/office/powerpoint/2010/main" val="494579730"/>
+        <p14:creationId xmlns:p14="http://schemas.microsoft.com/office/powerpoint/2010/main" xmlns="" val="494579730"/>
       </p:ext>
     </p:extLst>
   </p:cSld>
@@ -14141,7 +14464,7 @@
     </p:spTree>
     <p:extLst>
       <p:ext uri="{BB962C8B-B14F-4D97-AF65-F5344CB8AC3E}">
-        <p14:creationId xmlns:p14="http://schemas.microsoft.com/office/powerpoint/2010/main" val="494579730"/>
+        <p14:creationId xmlns:p14="http://schemas.microsoft.com/office/powerpoint/2010/main" xmlns="" val="494579730"/>
       </p:ext>
     </p:extLst>
   </p:cSld>

</xml_diff>